<commit_message>
typo fixes in ppt
</commit_message>
<xml_diff>
--- a/documents/milestone6.pptx
+++ b/documents/milestone6.pptx
@@ -202,7 +202,7 @@
           <a:p>
             <a:fld id="{3933248D-2855-48EF-92AE-4D39AA4FF72A}" type="datetimeFigureOut">
               <a:rPr lang="hu-HU" smtClean="0"/>
-              <a:t>2025. 05. 18.</a:t>
+              <a:t>2025. 05. 19.</a:t>
             </a:fld>
             <a:endParaRPr lang="hu-HU"/>
           </a:p>
@@ -5522,15 +5522,7 @@
             </a:r>
             <a:r>
               <a:rPr lang="hu-HU" sz="2400" b="1" dirty="0"/>
-              <a:t> </a:t>
-            </a:r>
-            <a:r>
-              <a:rPr lang="hu-HU" sz="2400" b="1" dirty="0" err="1"/>
-              <a:t>hsználata</a:t>
-            </a:r>
-            <a:r>
-              <a:rPr lang="hu-HU" sz="2400" b="1" dirty="0"/>
-              <a:t> adatvizualizációhoz</a:t>
+              <a:t> használata adatvizualizációhoz</a:t>
             </a:r>
           </a:p>
         </p:txBody>
@@ -5746,15 +5738,7 @@
             </a:r>
             <a:r>
               <a:rPr lang="hu-HU" sz="2400" b="1" dirty="0"/>
-              <a:t> </a:t>
-            </a:r>
-            <a:r>
-              <a:rPr lang="hu-HU" sz="2400" b="1" dirty="0" err="1"/>
-              <a:t>hsználata</a:t>
-            </a:r>
-            <a:r>
-              <a:rPr lang="hu-HU" sz="2400" b="1" dirty="0"/>
-              <a:t> adatvizualizációhoz</a:t>
+              <a:t> használata adatvizualizációhoz</a:t>
             </a:r>
           </a:p>
         </p:txBody>
@@ -5970,15 +5954,7 @@
             </a:r>
             <a:r>
               <a:rPr lang="hu-HU" sz="2400" b="1" dirty="0"/>
-              <a:t> </a:t>
-            </a:r>
-            <a:r>
-              <a:rPr lang="hu-HU" sz="2400" b="1" dirty="0" err="1"/>
-              <a:t>hsználata</a:t>
-            </a:r>
-            <a:r>
-              <a:rPr lang="hu-HU" sz="2400" b="1" dirty="0"/>
-              <a:t> adatvizualizációhoz</a:t>
+              <a:t> használata adatvizualizációhoz</a:t>
             </a:r>
           </a:p>
         </p:txBody>
@@ -6190,11 +6166,11 @@
           <a:p>
             <a:r>
               <a:rPr lang="hu-HU" sz="2400" b="1" dirty="0"/>
-              <a:t>Futtatás </a:t>
+              <a:t>Futtatás komondor-</a:t>
             </a:r>
             <a:r>
               <a:rPr lang="hu-HU" sz="2400" b="1" dirty="0" err="1"/>
-              <a:t>komonodor-on</a:t>
+              <a:t>on</a:t>
             </a:r>
             <a:endParaRPr lang="hu-HU" sz="2400" b="1" dirty="0"/>
           </a:p>
@@ -6393,11 +6369,11 @@
           <a:p>
             <a:r>
               <a:rPr lang="hu-HU" sz="2400" b="1" dirty="0"/>
-              <a:t>Futtatás </a:t>
+              <a:t>Futtatás komondor-</a:t>
             </a:r>
             <a:r>
               <a:rPr lang="hu-HU" sz="2400" b="1" dirty="0" err="1"/>
-              <a:t>komonodor-on</a:t>
+              <a:t>on</a:t>
             </a:r>
             <a:endParaRPr lang="hu-HU" sz="2400" b="1" dirty="0"/>
           </a:p>

</xml_diff>